<commit_message>
Reorganizing files for submission
Added instruction in Readme.md
</commit_message>
<xml_diff>
--- a/Slides/740- Anomaly Detector for Floodlight .pptx
+++ b/Slides/740- Anomaly Detector for Floodlight .pptx
@@ -214,7 +214,7 @@
           <a:p>
             <a:fld id="{B94CFE1E-B7F1-4B40-8BE5-E77C4CE0FFB6}" type="datetimeFigureOut">
               <a:rPr lang="en-US" smtClean="0"/>
-              <a:t>5/10/2013</a:t>
+              <a:t>5/15/2013</a:t>
             </a:fld>
             <a:endParaRPr lang="en-US"/>
           </a:p>
@@ -928,7 +928,7 @@
             <a:fld id="{1D8BD707-D9CF-40AE-B4C6-C98DA3205C09}" type="datetimeFigureOut">
               <a:rPr lang="en-US" smtClean="0"/>
               <a:pPr/>
-              <a:t>5/10/2013</a:t>
+              <a:t>5/15/2013</a:t>
             </a:fld>
             <a:endParaRPr lang="en-US"/>
           </a:p>
@@ -1195,7 +1195,7 @@
             <a:fld id="{1D8BD707-D9CF-40AE-B4C6-C98DA3205C09}" type="datetimeFigureOut">
               <a:rPr lang="en-US" smtClean="0"/>
               <a:pPr/>
-              <a:t>5/10/2013</a:t>
+              <a:t>5/15/2013</a:t>
             </a:fld>
             <a:endParaRPr lang="en-US"/>
           </a:p>
@@ -1372,7 +1372,7 @@
             <a:fld id="{1D8BD707-D9CF-40AE-B4C6-C98DA3205C09}" type="datetimeFigureOut">
               <a:rPr lang="en-US" smtClean="0"/>
               <a:pPr/>
-              <a:t>5/10/2013</a:t>
+              <a:t>5/15/2013</a:t>
             </a:fld>
             <a:endParaRPr lang="en-US"/>
           </a:p>
@@ -1539,7 +1539,7 @@
             <a:fld id="{1D8BD707-D9CF-40AE-B4C6-C98DA3205C09}" type="datetimeFigureOut">
               <a:rPr lang="en-US" smtClean="0"/>
               <a:pPr/>
-              <a:t>5/10/2013</a:t>
+              <a:t>5/15/2013</a:t>
             </a:fld>
             <a:endParaRPr lang="en-US"/>
           </a:p>
@@ -1790,7 +1790,7 @@
             <a:fld id="{1D8BD707-D9CF-40AE-B4C6-C98DA3205C09}" type="datetimeFigureOut">
               <a:rPr lang="en-US" smtClean="0"/>
               <a:pPr/>
-              <a:t>5/10/2013</a:t>
+              <a:t>5/15/2013</a:t>
             </a:fld>
             <a:endParaRPr lang="en-US"/>
           </a:p>
@@ -2075,7 +2075,7 @@
             <a:fld id="{1D8BD707-D9CF-40AE-B4C6-C98DA3205C09}" type="datetimeFigureOut">
               <a:rPr lang="en-US" smtClean="0"/>
               <a:pPr/>
-              <a:t>5/10/2013</a:t>
+              <a:t>5/15/2013</a:t>
             </a:fld>
             <a:endParaRPr lang="en-US"/>
           </a:p>
@@ -2516,7 +2516,7 @@
             <a:fld id="{1D8BD707-D9CF-40AE-B4C6-C98DA3205C09}" type="datetimeFigureOut">
               <a:rPr lang="en-US" smtClean="0"/>
               <a:pPr/>
-              <a:t>5/10/2013</a:t>
+              <a:t>5/15/2013</a:t>
             </a:fld>
             <a:endParaRPr lang="en-US"/>
           </a:p>
@@ -2631,7 +2631,7 @@
             <a:fld id="{1D8BD707-D9CF-40AE-B4C6-C98DA3205C09}" type="datetimeFigureOut">
               <a:rPr lang="en-US" smtClean="0"/>
               <a:pPr/>
-              <a:t>5/10/2013</a:t>
+              <a:t>5/15/2013</a:t>
             </a:fld>
             <a:endParaRPr lang="en-US"/>
           </a:p>
@@ -2723,7 +2723,7 @@
             <a:fld id="{1D8BD707-D9CF-40AE-B4C6-C98DA3205C09}" type="datetimeFigureOut">
               <a:rPr lang="en-US" smtClean="0"/>
               <a:pPr/>
-              <a:t>5/10/2013</a:t>
+              <a:t>5/15/2013</a:t>
             </a:fld>
             <a:endParaRPr lang="en-US"/>
           </a:p>
@@ -2967,7 +2967,7 @@
             <a:fld id="{1D8BD707-D9CF-40AE-B4C6-C98DA3205C09}" type="datetimeFigureOut">
               <a:rPr lang="en-US" smtClean="0"/>
               <a:pPr/>
-              <a:t>5/10/2013</a:t>
+              <a:t>5/15/2013</a:t>
             </a:fld>
             <a:endParaRPr lang="en-US"/>
           </a:p>
@@ -3263,7 +3263,7 @@
             <a:fld id="{1D8BD707-D9CF-40AE-B4C6-C98DA3205C09}" type="datetimeFigureOut">
               <a:rPr lang="en-US" smtClean="0"/>
               <a:pPr/>
-              <a:t>5/10/2013</a:t>
+              <a:t>5/15/2013</a:t>
             </a:fld>
             <a:endParaRPr lang="en-US"/>
           </a:p>
@@ -3559,7 +3559,7 @@
             <a:fld id="{1D8BD707-D9CF-40AE-B4C6-C98DA3205C09}" type="datetimeFigureOut">
               <a:rPr lang="en-US" smtClean="0"/>
               <a:pPr/>
-              <a:t>5/10/2013</a:t>
+              <a:t>5/15/2013</a:t>
             </a:fld>
             <a:endParaRPr lang="en-US"/>
           </a:p>
@@ -6056,14 +6056,14 @@
           <p:cNvPr id="104" name="Elbow Connector 103"/>
           <p:cNvCxnSpPr>
             <a:stCxn id="11" idx="0"/>
-            <a:endCxn id="60" idx="1"/>
+            <a:endCxn id="8" idx="1"/>
           </p:cNvCxnSpPr>
           <p:nvPr/>
         </p:nvCxnSpPr>
         <p:spPr>
           <a:xfrm rot="5400000" flipH="1" flipV="1">
-            <a:off x="1705207" y="2144082"/>
-            <a:ext cx="3000031" cy="1214377"/>
+            <a:off x="2206901" y="2607676"/>
+            <a:ext cx="2034742" cy="1252477"/>
           </a:xfrm>
           <a:prstGeom prst="bentConnector2">
             <a:avLst/>
@@ -16557,12 +16557,8 @@
               <a:t>and </a:t>
             </a:r>
             <a:r>
-              <a:rPr lang="en-US" dirty="0" err="1" smtClean="0"/>
-              <a:t>insucient</a:t>
-            </a:r>
-            <a:r>
               <a:rPr lang="en-US" dirty="0" smtClean="0"/>
-              <a:t> </a:t>
+              <a:t>insufficient </a:t>
             </a:r>
             <a:r>
               <a:rPr lang="en-US" dirty="0"/>
@@ -16989,11 +16985,7 @@
             <a:pPr marL="800100" lvl="1" indent="-342900"/>
             <a:r>
               <a:rPr lang="en-US" dirty="0" smtClean="0"/>
-              <a:t>Open </a:t>
-            </a:r>
-            <a:r>
-              <a:rPr lang="en-US" dirty="0" smtClean="0"/>
-              <a:t> </a:t>
+              <a:t>Open  </a:t>
             </a:r>
             <a:r>
               <a:rPr lang="en-US" dirty="0" err="1" smtClean="0"/>
@@ -17001,11 +16993,7 @@
             </a:r>
             <a:r>
               <a:rPr lang="en-US" dirty="0" smtClean="0"/>
-              <a:t> </a:t>
-            </a:r>
-            <a:r>
-              <a:rPr lang="en-US" dirty="0" smtClean="0"/>
-              <a:t>does not recognize all the flow mod actions</a:t>
+              <a:t> does not recognize all the flow mod actions</a:t>
             </a:r>
           </a:p>
           <a:p>
@@ -17053,13 +17041,8 @@
             <a:pPr marL="800100" lvl="1" indent="-342900"/>
             <a:r>
               <a:rPr lang="en-US" dirty="0" smtClean="0"/>
-              <a:t>Does not allow the module to retrieve flow </a:t>
-            </a:r>
-            <a:r>
-              <a:rPr lang="en-US" dirty="0" smtClean="0"/>
-              <a:t>information until any detection</a:t>
-            </a:r>
-            <a:endParaRPr lang="en-US" dirty="0" smtClean="0"/>
+              <a:t>Does not allow the module to retrieve flow information until any detection</a:t>
+            </a:r>
           </a:p>
           <a:p>
             <a:pPr marL="800100" lvl="1" indent="-342900"/>
@@ -17176,15 +17159,7 @@
             <a:pPr marL="800100" lvl="1" indent="-342900"/>
             <a:r>
               <a:rPr lang="en-US" sz="1100" dirty="0" smtClean="0"/>
-              <a:t>Create cluster for each of these </a:t>
-            </a:r>
-            <a:r>
-              <a:rPr lang="en-US" sz="1100" dirty="0" smtClean="0"/>
-              <a:t>signatures and also create </a:t>
-            </a:r>
-            <a:r>
-              <a:rPr lang="en-US" sz="1100" dirty="0" smtClean="0"/>
-              <a:t>some base clusters (e.g. from source 10.0.0.0/16 to Any </a:t>
+              <a:t>Create cluster for each of these signatures and also create some base clusters (e.g. from source 10.0.0.0/16 to Any </a:t>
             </a:r>
             <a:r>
               <a:rPr lang="en-US" sz="1100" dirty="0" err="1" smtClean="0"/>
@@ -17235,15 +17210,7 @@
             <a:pPr marL="800100" lvl="1" indent="-342900"/>
             <a:r>
               <a:rPr lang="en-US" sz="1100" dirty="0" smtClean="0"/>
-              <a:t>Generate report </a:t>
-            </a:r>
-            <a:r>
-              <a:rPr lang="en-US" sz="1100" dirty="0" smtClean="0"/>
-              <a:t>with </a:t>
-            </a:r>
-            <a:r>
-              <a:rPr lang="en-US" sz="1100" dirty="0" smtClean="0"/>
-              <a:t>the meaningful clusters + anomalies + any interesting/misbehaving unique flows</a:t>
+              <a:t>Generate report with the meaningful clusters + anomalies + any interesting/misbehaving unique flows</a:t>
             </a:r>
           </a:p>
           <a:p>
@@ -17285,15 +17252,7 @@
             <a:pPr marL="800100" lvl="1" indent="-342900"/>
             <a:r>
               <a:rPr lang="en-US" sz="1100" dirty="0" smtClean="0"/>
-              <a:t>The controller module </a:t>
-            </a:r>
-            <a:r>
-              <a:rPr lang="en-US" sz="1100" dirty="0" smtClean="0"/>
-              <a:t>has now </a:t>
-            </a:r>
-            <a:r>
-              <a:rPr lang="en-US" sz="1100" dirty="0" smtClean="0"/>
-              <a:t>information about each unique flow </a:t>
+              <a:t>The controller module has now information about each unique flow </a:t>
             </a:r>
           </a:p>
           <a:p>

</xml_diff>